<commit_message>
Add examples for hypothesis testing
</commit_message>
<xml_diff>
--- a/statistics/doc/estimation.pptx
+++ b/statistics/doc/estimation.pptx
@@ -3429,11 +3429,7 @@
           <a:p>
             <a:r>
               <a:rPr lang="en-US" dirty="0" smtClean="0"/>
-              <a:t>Point &amp; </a:t>
-            </a:r>
-            <a:r>
-              <a:rPr lang="en-US" dirty="0" smtClean="0"/>
-              <a:t>Interval</a:t>
+              <a:t>Point &amp; Interval</a:t>
             </a:r>
             <a:br>
               <a:rPr lang="en-US" dirty="0" smtClean="0"/>
@@ -4684,6 +4680,46 @@
           </a:fontRef>
         </p:style>
       </p:cxnSp>
+      <p:graphicFrame>
+        <p:nvGraphicFramePr>
+          <p:cNvPr id="40977" name="Object 17"/>
+          <p:cNvGraphicFramePr>
+            <a:graphicFrameLocks noChangeAspect="1"/>
+          </p:cNvGraphicFramePr>
+          <p:nvPr/>
+        </p:nvGraphicFramePr>
+        <p:xfrm>
+          <a:off x="6084168" y="116632"/>
+          <a:ext cx="1698625" cy="657225"/>
+        </p:xfrm>
+        <a:graphic>
+          <a:graphicData uri="http://schemas.openxmlformats.org/presentationml/2006/ole">
+            <p:oleObj spid="_x0000_s40977" name="Equation" r:id="rId17" imgW="1117440" imgH="431640" progId="Equation.3">
+              <p:embed/>
+            </p:oleObj>
+          </a:graphicData>
+        </a:graphic>
+      </p:graphicFrame>
+      <p:graphicFrame>
+        <p:nvGraphicFramePr>
+          <p:cNvPr id="40978" name="Object 18"/>
+          <p:cNvGraphicFramePr>
+            <a:graphicFrameLocks noChangeAspect="1"/>
+          </p:cNvGraphicFramePr>
+          <p:nvPr/>
+        </p:nvGraphicFramePr>
+        <p:xfrm>
+          <a:off x="6338888" y="900113"/>
+          <a:ext cx="1331912" cy="385762"/>
+        </p:xfrm>
+        <a:graphic>
+          <a:graphicData uri="http://schemas.openxmlformats.org/presentationml/2006/ole">
+            <p:oleObj spid="_x0000_s40978" name="Equation" r:id="rId18" imgW="876240" imgH="253800" progId="Equation.3">
+              <p:embed/>
+            </p:oleObj>
+          </a:graphicData>
+        </a:graphic>
+      </p:graphicFrame>
     </p:spTree>
   </p:cSld>
   <p:clrMapOvr>

</xml_diff>